<commit_message>
Refactor pizzaPopularity function for improved data aggregation and processing
</commit_message>
<xml_diff>
--- a/Pizza Dashboard.pptx
+++ b/Pizza Dashboard.pptx
@@ -112,6 +112,11 @@
       </a:defRPr>
     </a:lvl9pPr>
   </p:defaultTextStyle>
+  <p:extLst>
+    <p:ext uri="{EFAFB233-063F-42B5-8137-9DF3F51BA10A}">
+      <p15:sldGuideLst xmlns:p15="http://schemas.microsoft.com/office/powerpoint/2012/main"/>
+    </p:ext>
+  </p:extLst>
 </p:presentation>
 </file>
 
@@ -3380,8 +3385,13 @@
           <a:p>
             <a:r>
               <a:rPr lang="de-DE" dirty="0"/>
-              <a:t>1435234, 1437782, Tristan Buls, 1352346</a:t>
-            </a:r>
+              <a:t>1435234, 1437782, Tristan Buls</a:t>
+            </a:r>
+            <a:r>
+              <a:rPr lang="de-DE"/>
+              <a:t>, 1352346, 1432965</a:t>
+            </a:r>
+            <a:endParaRPr lang="de-DE" dirty="0"/>
           </a:p>
         </p:txBody>
       </p:sp>

</xml_diff>